<commit_message>
Creation du service product-service
</commit_message>
<xml_diff>
--- a/Introduction/Intoduction_devops.pptx
+++ b/Introduction/Intoduction_devops.pptx
@@ -110,6 +110,11 @@
       </a:defRPr>
     </a:lvl9pPr>
   </p:defaultTextStyle>
+  <p:extLst>
+    <p:ext uri="{EFAFB233-063F-42B5-8137-9DF3F51BA10A}">
+      <p15:sldGuideLst xmlns:p15="http://schemas.microsoft.com/office/powerpoint/2012/main"/>
+    </p:ext>
+  </p:extLst>
 </p:presentation>
 </file>
 
@@ -3855,7 +3860,7 @@
       </p:grpSpPr>
       <p:pic>
         <p:nvPicPr>
-          <p:cNvPr id="10" name="Content Placeholder 9"/>
+          <p:cNvPr id="4" name="Content Placeholder 3"/>
           <p:cNvPicPr>
             <a:picLocks noGrp="1" noChangeAspect="1"/>
           </p:cNvPicPr>
@@ -3871,8 +3876,8 @@
         </p:blipFill>
         <p:spPr>
           <a:xfrm>
-            <a:off x="703985" y="422031"/>
-            <a:ext cx="10817455" cy="6106855"/>
+            <a:off x="506602" y="232653"/>
+            <a:ext cx="11310260" cy="6314407"/>
           </a:xfrm>
           <a:prstGeom prst="rect">
             <a:avLst/>

</xml_diff>